<commit_message>
Jpeg for announcement list and filters added
</commit_message>
<xml_diff>
--- a/Prezentare Imobiliare.pptx
+++ b/Prezentare Imobiliare.pptx
@@ -321,7 +321,7 @@
             <a:fld id="{1D8BD707-D9CF-40AE-B4C6-C98DA3205C09}" type="datetimeFigureOut">
               <a:rPr lang="en-US" smtClean="0"/>
               <a:pPr/>
-              <a:t>10/03/2020</a:t>
+              <a:t>3/10/2020</a:t>
             </a:fld>
             <a:endParaRPr lang="en-US"/>
           </a:p>
@@ -521,7 +521,7 @@
             <a:fld id="{1D8BD707-D9CF-40AE-B4C6-C98DA3205C09}" type="datetimeFigureOut">
               <a:rPr lang="en-US" smtClean="0"/>
               <a:pPr/>
-              <a:t>10/03/2020</a:t>
+              <a:t>3/10/2020</a:t>
             </a:fld>
             <a:endParaRPr lang="en-US"/>
           </a:p>
@@ -698,7 +698,7 @@
             <a:fld id="{1D8BD707-D9CF-40AE-B4C6-C98DA3205C09}" type="datetimeFigureOut">
               <a:rPr lang="en-US" smtClean="0"/>
               <a:pPr/>
-              <a:t>10/03/2020</a:t>
+              <a:t>3/10/2020</a:t>
             </a:fld>
             <a:endParaRPr lang="en-US"/>
           </a:p>
@@ -863,7 +863,7 @@
             <a:fld id="{1D8BD707-D9CF-40AE-B4C6-C98DA3205C09}" type="datetimeFigureOut">
               <a:rPr lang="en-US" smtClean="0"/>
               <a:pPr/>
-              <a:t>10/03/2020</a:t>
+              <a:t>3/10/2020</a:t>
             </a:fld>
             <a:endParaRPr lang="en-US"/>
           </a:p>
@@ -1113,7 +1113,7 @@
             <a:fld id="{1D8BD707-D9CF-40AE-B4C6-C98DA3205C09}" type="datetimeFigureOut">
               <a:rPr lang="en-US" smtClean="0"/>
               <a:pPr/>
-              <a:t>10/03/2020</a:t>
+              <a:t>3/10/2020</a:t>
             </a:fld>
             <a:endParaRPr lang="en-US"/>
           </a:p>
@@ -1432,7 +1432,7 @@
             <a:fld id="{1D8BD707-D9CF-40AE-B4C6-C98DA3205C09}" type="datetimeFigureOut">
               <a:rPr lang="en-US" smtClean="0"/>
               <a:pPr/>
-              <a:t>10/03/2020</a:t>
+              <a:t>3/10/2020</a:t>
             </a:fld>
             <a:endParaRPr lang="en-US"/>
           </a:p>
@@ -1900,7 +1900,7 @@
             <a:fld id="{1D8BD707-D9CF-40AE-B4C6-C98DA3205C09}" type="datetimeFigureOut">
               <a:rPr lang="en-US" smtClean="0"/>
               <a:pPr/>
-              <a:t>10/03/2020</a:t>
+              <a:t>3/10/2020</a:t>
             </a:fld>
             <a:endParaRPr lang="en-US"/>
           </a:p>
@@ -2049,7 +2049,7 @@
             <a:fld id="{1D8BD707-D9CF-40AE-B4C6-C98DA3205C09}" type="datetimeFigureOut">
               <a:rPr lang="en-US" smtClean="0"/>
               <a:pPr/>
-              <a:t>10/03/2020</a:t>
+              <a:t>3/10/2020</a:t>
             </a:fld>
             <a:endParaRPr lang="en-US"/>
           </a:p>
@@ -2141,7 +2141,7 @@
             <a:fld id="{1D8BD707-D9CF-40AE-B4C6-C98DA3205C09}" type="datetimeFigureOut">
               <a:rPr lang="en-US" smtClean="0"/>
               <a:pPr/>
-              <a:t>10/03/2020</a:t>
+              <a:t>3/10/2020</a:t>
             </a:fld>
             <a:endParaRPr lang="en-US"/>
           </a:p>
@@ -2417,7 +2417,7 @@
             <a:fld id="{1D8BD707-D9CF-40AE-B4C6-C98DA3205C09}" type="datetimeFigureOut">
               <a:rPr lang="en-US" smtClean="0"/>
               <a:pPr/>
-              <a:t>10/03/2020</a:t>
+              <a:t>3/10/2020</a:t>
             </a:fld>
             <a:endParaRPr lang="en-US"/>
           </a:p>
@@ -2724,7 +2724,7 @@
             <a:fld id="{1D8BD707-D9CF-40AE-B4C6-C98DA3205C09}" type="datetimeFigureOut">
               <a:rPr lang="en-US" smtClean="0"/>
               <a:pPr/>
-              <a:t>10/03/2020</a:t>
+              <a:t>3/10/2020</a:t>
             </a:fld>
             <a:endParaRPr lang="en-US"/>
           </a:p>
@@ -3024,7 +3024,7 @@
             <a:fld id="{1D8BD707-D9CF-40AE-B4C6-C98DA3205C09}" type="datetimeFigureOut">
               <a:rPr lang="en-US" smtClean="0"/>
               <a:pPr/>
-              <a:t>10/03/2020</a:t>
+              <a:t>3/10/2020</a:t>
             </a:fld>
             <a:endParaRPr lang="en-US"/>
           </a:p>
@@ -3727,10 +3727,15 @@
             <p:ph type="title"/>
           </p:nvPr>
         </p:nvSpPr>
-        <p:spPr/>
+        <p:spPr>
+          <a:xfrm>
+            <a:off x="457200" y="533400"/>
+            <a:ext cx="8610600" cy="990600"/>
+          </a:xfrm>
+        </p:spPr>
         <p:txBody>
           <a:bodyPr>
-            <a:normAutofit fontScale="90000"/>
+            <a:noAutofit/>
           </a:bodyPr>
           <a:lstStyle/>
           <a:p>
@@ -3799,6 +3804,42 @@
           </a:p>
         </p:txBody>
       </p:sp>
+      <p:pic>
+        <p:nvPicPr>
+          <p:cNvPr id="7" name="Picture 6">
+            <a:extLst>
+              <a:ext uri="{FF2B5EF4-FFF2-40B4-BE49-F238E27FC236}">
+                <a16:creationId xmlns:a16="http://schemas.microsoft.com/office/drawing/2014/main" id="{39561732-349A-498E-BF29-526A3EAD054A}"/>
+              </a:ext>
+            </a:extLst>
+          </p:cNvPr>
+          <p:cNvPicPr>
+            <a:picLocks noChangeAspect="1"/>
+          </p:cNvPicPr>
+          <p:nvPr/>
+        </p:nvPicPr>
+        <p:blipFill>
+          <a:blip r:embed="rId2">
+            <a:extLst>
+              <a:ext uri="{28A0092B-C50C-407E-A947-70E740481C1C}">
+                <a14:useLocalDpi xmlns:a14="http://schemas.microsoft.com/office/drawing/2010/main" val="0"/>
+              </a:ext>
+            </a:extLst>
+          </a:blip>
+          <a:stretch>
+            <a:fillRect/>
+          </a:stretch>
+        </p:blipFill>
+        <p:spPr>
+          <a:xfrm>
+            <a:off x="947737" y="1319212"/>
+            <a:ext cx="7248525" cy="5438775"/>
+          </a:xfrm>
+          <a:prstGeom prst="rect">
+            <a:avLst/>
+          </a:prstGeom>
+        </p:spPr>
+      </p:pic>
     </p:spTree>
     <p:extLst>
       <p:ext uri="{BB962C8B-B14F-4D97-AF65-F5344CB8AC3E}">
@@ -3841,7 +3882,9 @@
         </p:nvSpPr>
         <p:spPr/>
         <p:txBody>
-          <a:bodyPr/>
+          <a:bodyPr>
+            <a:normAutofit/>
+          </a:bodyPr>
           <a:lstStyle/>
           <a:p>
             <a:r>
@@ -6352,38 +6395,41 @@
         </p:nvSpPr>
         <p:spPr/>
         <p:txBody>
-          <a:bodyPr/>
+          <a:bodyPr>
+            <a:normAutofit/>
+          </a:bodyPr>
           <a:lstStyle/>
           <a:p>
-            <a:r>
-              <a:rPr lang="en-US" dirty="0" err="1"/>
+            <a:pPr algn="ctr"/>
+            <a:r>
+              <a:rPr lang="en-US" sz="3200" dirty="0" err="1"/>
               <a:t>Func</a:t>
             </a:r>
             <a:r>
-              <a:rPr lang="ro-RO" dirty="0"/>
+              <a:rPr lang="ro-RO" sz="3200" dirty="0"/>
               <a:t>ț</a:t>
             </a:r>
             <a:r>
-              <a:rPr lang="en-US" dirty="0" err="1"/>
+              <a:rPr lang="en-US" sz="3200" dirty="0" err="1"/>
               <a:t>ionalit</a:t>
             </a:r>
             <a:r>
-              <a:rPr lang="ro-RO" dirty="0"/>
+              <a:rPr lang="ro-RO" sz="3200" dirty="0"/>
               <a:t>ăț</a:t>
             </a:r>
             <a:r>
-              <a:rPr lang="en-US" dirty="0" err="1"/>
+              <a:rPr lang="en-US" sz="3200" dirty="0" err="1"/>
               <a:t>ile</a:t>
             </a:r>
             <a:r>
-              <a:rPr lang="en-US" dirty="0"/>
-              <a:t> </a:t>
-            </a:r>
-            <a:r>
-              <a:rPr lang="en-US" dirty="0" err="1"/>
+              <a:rPr lang="en-US" sz="3200" dirty="0"/>
+              <a:t> </a:t>
+            </a:r>
+            <a:r>
+              <a:rPr lang="en-US" sz="3200" dirty="0" err="1"/>
               <a:t>sistemului</a:t>
             </a:r>
-            <a:endParaRPr lang="en-US" dirty="0"/>
+            <a:endParaRPr lang="en-US" sz="3200" dirty="0"/>
           </a:p>
         </p:txBody>
       </p:sp>
@@ -7929,7 +7975,9 @@
         </p:nvSpPr>
         <p:spPr/>
         <p:txBody>
-          <a:bodyPr/>
+          <a:bodyPr>
+            <a:normAutofit/>
+          </a:bodyPr>
           <a:lstStyle/>
           <a:p>
             <a:r>
@@ -8084,7 +8132,9 @@
         </p:nvSpPr>
         <p:spPr/>
         <p:txBody>
-          <a:bodyPr/>
+          <a:bodyPr>
+            <a:normAutofit/>
+          </a:bodyPr>
           <a:lstStyle/>
           <a:p>
             <a:r>
@@ -8156,6 +8206,42 @@
           </a:p>
         </p:txBody>
       </p:sp>
+      <p:pic>
+        <p:nvPicPr>
+          <p:cNvPr id="5" name="Picture 4">
+            <a:extLst>
+              <a:ext uri="{FF2B5EF4-FFF2-40B4-BE49-F238E27FC236}">
+                <a16:creationId xmlns:a16="http://schemas.microsoft.com/office/drawing/2014/main" id="{737EDAEF-1C92-448E-8AAA-2A8F03381F1D}"/>
+              </a:ext>
+            </a:extLst>
+          </p:cNvPr>
+          <p:cNvPicPr>
+            <a:picLocks noChangeAspect="1"/>
+          </p:cNvPicPr>
+          <p:nvPr/>
+        </p:nvPicPr>
+        <p:blipFill>
+          <a:blip r:embed="rId2">
+            <a:extLst>
+              <a:ext uri="{28A0092B-C50C-407E-A947-70E740481C1C}">
+                <a14:useLocalDpi xmlns:a14="http://schemas.microsoft.com/office/drawing/2010/main" val="0"/>
+              </a:ext>
+            </a:extLst>
+          </a:blip>
+          <a:stretch>
+            <a:fillRect/>
+          </a:stretch>
+        </p:blipFill>
+        <p:spPr>
+          <a:xfrm>
+            <a:off x="762000" y="1551495"/>
+            <a:ext cx="7248525" cy="4486275"/>
+          </a:xfrm>
+          <a:prstGeom prst="rect">
+            <a:avLst/>
+          </a:prstGeom>
+        </p:spPr>
+      </p:pic>
     </p:spTree>
     <p:extLst>
       <p:ext uri="{BB962C8B-B14F-4D97-AF65-F5344CB8AC3E}">

</xml_diff>